<commit_message>
Update presentation with polish and corrections
</commit_message>
<xml_diff>
--- a/01_unikernels_presentation.pptx
+++ b/01_unikernels_presentation.pptx
@@ -112,6 +112,11 @@
       </a:defRPr>
     </a:lvl9pPr>
   </p:defaultTextStyle>
+  <p:extLst>
+    <p:ext uri="{EFAFB233-063F-42B5-8137-9DF3F51BA10A}">
+      <p15:sldGuideLst xmlns:p15="http://schemas.microsoft.com/office/powerpoint/2012/main"/>
+    </p:ext>
+  </p:extLst>
 </p:presentation>
 </file>
 
@@ -266,7 +271,7 @@
           <a:p>
             <a:fld id="{C4009130-A059-476B-B3BC-ACCAA4055085}" type="datetimeFigureOut">
               <a:rPr lang="en-US" smtClean="0"/>
-              <a:t>2018-01-24</a:t>
+              <a:t>2018-01-28</a:t>
             </a:fld>
             <a:endParaRPr lang="en-US"/>
           </a:p>
@@ -464,7 +469,7 @@
           <a:p>
             <a:fld id="{C4009130-A059-476B-B3BC-ACCAA4055085}" type="datetimeFigureOut">
               <a:rPr lang="en-US" smtClean="0"/>
-              <a:t>2018-01-24</a:t>
+              <a:t>2018-01-28</a:t>
             </a:fld>
             <a:endParaRPr lang="en-US"/>
           </a:p>
@@ -672,7 +677,7 @@
           <a:p>
             <a:fld id="{C4009130-A059-476B-B3BC-ACCAA4055085}" type="datetimeFigureOut">
               <a:rPr lang="en-US" smtClean="0"/>
-              <a:t>2018-01-24</a:t>
+              <a:t>2018-01-28</a:t>
             </a:fld>
             <a:endParaRPr lang="en-US"/>
           </a:p>
@@ -870,7 +875,7 @@
           <a:p>
             <a:fld id="{C4009130-A059-476B-B3BC-ACCAA4055085}" type="datetimeFigureOut">
               <a:rPr lang="en-US" smtClean="0"/>
-              <a:t>2018-01-24</a:t>
+              <a:t>2018-01-28</a:t>
             </a:fld>
             <a:endParaRPr lang="en-US"/>
           </a:p>
@@ -1145,7 +1150,7 @@
           <a:p>
             <a:fld id="{C4009130-A059-476B-B3BC-ACCAA4055085}" type="datetimeFigureOut">
               <a:rPr lang="en-US" smtClean="0"/>
-              <a:t>2018-01-24</a:t>
+              <a:t>2018-01-28</a:t>
             </a:fld>
             <a:endParaRPr lang="en-US"/>
           </a:p>
@@ -1410,7 +1415,7 @@
           <a:p>
             <a:fld id="{C4009130-A059-476B-B3BC-ACCAA4055085}" type="datetimeFigureOut">
               <a:rPr lang="en-US" smtClean="0"/>
-              <a:t>2018-01-24</a:t>
+              <a:t>2018-01-28</a:t>
             </a:fld>
             <a:endParaRPr lang="en-US"/>
           </a:p>
@@ -1822,7 +1827,7 @@
           <a:p>
             <a:fld id="{C4009130-A059-476B-B3BC-ACCAA4055085}" type="datetimeFigureOut">
               <a:rPr lang="en-US" smtClean="0"/>
-              <a:t>2018-01-24</a:t>
+              <a:t>2018-01-28</a:t>
             </a:fld>
             <a:endParaRPr lang="en-US"/>
           </a:p>
@@ -1963,7 +1968,7 @@
           <a:p>
             <a:fld id="{C4009130-A059-476B-B3BC-ACCAA4055085}" type="datetimeFigureOut">
               <a:rPr lang="en-US" smtClean="0"/>
-              <a:t>2018-01-24</a:t>
+              <a:t>2018-01-28</a:t>
             </a:fld>
             <a:endParaRPr lang="en-US"/>
           </a:p>
@@ -2076,7 +2081,7 @@
           <a:p>
             <a:fld id="{C4009130-A059-476B-B3BC-ACCAA4055085}" type="datetimeFigureOut">
               <a:rPr lang="en-US" smtClean="0"/>
-              <a:t>2018-01-24</a:t>
+              <a:t>2018-01-28</a:t>
             </a:fld>
             <a:endParaRPr lang="en-US"/>
           </a:p>
@@ -2387,7 +2392,7 @@
           <a:p>
             <a:fld id="{C4009130-A059-476B-B3BC-ACCAA4055085}" type="datetimeFigureOut">
               <a:rPr lang="en-US" smtClean="0"/>
-              <a:t>2018-01-24</a:t>
+              <a:t>2018-01-28</a:t>
             </a:fld>
             <a:endParaRPr lang="en-US"/>
           </a:p>
@@ -2675,7 +2680,7 @@
           <a:p>
             <a:fld id="{C4009130-A059-476B-B3BC-ACCAA4055085}" type="datetimeFigureOut">
               <a:rPr lang="en-US" smtClean="0"/>
-              <a:t>2018-01-24</a:t>
+              <a:t>2018-01-28</a:t>
             </a:fld>
             <a:endParaRPr lang="en-US"/>
           </a:p>
@@ -2916,7 +2921,7 @@
           <a:p>
             <a:fld id="{C4009130-A059-476B-B3BC-ACCAA4055085}" type="datetimeFigureOut">
               <a:rPr lang="en-US" smtClean="0"/>
-              <a:t>2018-01-24</a:t>
+              <a:t>2018-01-28</a:t>
             </a:fld>
             <a:endParaRPr lang="en-US"/>
           </a:p>
@@ -3362,6 +3367,10 @@
               <a:rPr lang="en-US" dirty="0"/>
               <a:t> (critic)</a:t>
             </a:r>
+            <a:br>
+              <a:rPr lang="en-US" dirty="0"/>
+            </a:br>
+            <a:endParaRPr lang="en-US" dirty="0"/>
           </a:p>
         </p:txBody>
       </p:sp>
@@ -3383,12 +3392,63 @@
         </p:nvSpPr>
         <p:spPr/>
         <p:txBody>
-          <a:bodyPr/>
-          <a:lstStyle/>
-          <a:p>
-            <a:r>
-              <a:rPr lang="en-US" dirty="0"/>
-              <a:t>Tom Read Cutting</a:t>
+          <a:bodyPr>
+            <a:normAutofit fontScale="92500" lnSpcReduction="20000"/>
+          </a:bodyPr>
+          <a:lstStyle/>
+          <a:p>
+            <a:r>
+              <a:rPr lang="en-US" dirty="0"/>
+              <a:t>Paper by Anil </a:t>
+            </a:r>
+            <a:r>
+              <a:rPr lang="en-US" dirty="0" err="1"/>
+              <a:t>Madhavapeddy</a:t>
+            </a:r>
+            <a:r>
+              <a:rPr lang="en-US" dirty="0"/>
+              <a:t>, Richard </a:t>
+            </a:r>
+            <a:r>
+              <a:rPr lang="en-US" dirty="0" err="1"/>
+              <a:t>Mortier</a:t>
+            </a:r>
+            <a:r>
+              <a:rPr lang="en-US" dirty="0"/>
+              <a:t>, </a:t>
+            </a:r>
+            <a:r>
+              <a:rPr lang="en-US" dirty="0" err="1"/>
+              <a:t>Charalampos</a:t>
+            </a:r>
+            <a:r>
+              <a:rPr lang="en-US" dirty="0"/>
+              <a:t> </a:t>
+            </a:r>
+            <a:r>
+              <a:rPr lang="en-US" dirty="0" err="1"/>
+              <a:t>Rotsos</a:t>
+            </a:r>
+            <a:r>
+              <a:rPr lang="en-US" dirty="0"/>
+              <a:t>, David Scott, Balraj Singh, Thomas </a:t>
+            </a:r>
+            <a:r>
+              <a:rPr lang="en-US" dirty="0" err="1"/>
+              <a:t>Gazagnaire</a:t>
+            </a:r>
+            <a:r>
+              <a:rPr lang="en-US" dirty="0"/>
+              <a:t>, Steven Smith, Steven Hand and Jon Crowcroft</a:t>
+            </a:r>
+          </a:p>
+          <a:p>
+            <a:endParaRPr lang="en-US" dirty="0"/>
+          </a:p>
+          <a:p>
+            <a:r>
+              <a:rPr lang="en-US" dirty="0"/>
+              <a:t>Presented by Tom Read Cutting</a:t>
             </a:r>
           </a:p>
         </p:txBody>
@@ -3473,18 +3533,14 @@
           <a:lstStyle/>
           <a:p>
             <a:r>
-              <a:rPr lang="en-US" dirty="0" err="1"/>
-              <a:t>Datacentres</a:t>
-            </a:r>
-            <a:r>
-              <a:rPr lang="en-US" dirty="0"/>
-              <a:t> are a thing</a:t>
-            </a:r>
-          </a:p>
-          <a:p>
-            <a:r>
-              <a:rPr lang="en-US" dirty="0"/>
-              <a:t>Servers are a thing</a:t>
+              <a:rPr lang="en-US" dirty="0"/>
+              <a:t>Datacenters are a thing.</a:t>
+            </a:r>
+          </a:p>
+          <a:p>
+            <a:r>
+              <a:rPr lang="en-US" dirty="0"/>
+              <a:t>Servers are a thing.</a:t>
             </a:r>
           </a:p>
           <a:p>
@@ -3498,7 +3554,7 @@
             </a:r>
             <a:r>
               <a:rPr lang="en-US" dirty="0"/>
-              <a:t> Xen, KVM)</a:t>
+              <a:t> Xen, KVM).</a:t>
             </a:r>
           </a:p>
           <a:p>
@@ -3590,7 +3646,7 @@
           <a:p>
             <a:r>
               <a:rPr lang="en-US" dirty="0"/>
-              <a:t>Usually applications are programmed against a runtime operating system which provides services that abstracts hardware, provides features and otherwise makes application-development a pleasant(</a:t>
+              <a:t>Usually applications are programmed against a runtime operating system which provides services that abstracts hardware, enables features and otherwise makes application-development a pleasant(-</a:t>
             </a:r>
             <a:r>
               <a:rPr lang="en-US" dirty="0" err="1"/>
@@ -3604,7 +3660,15 @@
           <a:p>
             <a:r>
               <a:rPr lang="en-US" dirty="0"/>
-              <a:t>A library operating systems is that, a library that an application is statically compiled with that means that resulting binary is a kernel that can run directly on hardware!</a:t>
+              <a:t>A </a:t>
+            </a:r>
+            <a:r>
+              <a:rPr lang="en-US" i="1" dirty="0"/>
+              <a:t>library</a:t>
+            </a:r>
+            <a:r>
+              <a:rPr lang="en-US" dirty="0"/>
+              <a:t> operating systems is just that, a library that an application is statically compiled with that means that resulting binary is a kernel that can run directly on hardware!</a:t>
             </a:r>
           </a:p>
           <a:p>
@@ -3618,13 +3682,13 @@
             </a:r>
             <a:r>
               <a:rPr lang="en-US" dirty="0"/>
-              <a:t> PS2)</a:t>
-            </a:r>
-          </a:p>
-          <a:p>
-            <a:r>
-              <a:rPr lang="en-US" dirty="0"/>
-              <a:t>Hard to do when you need to support a wide range of hardware.</a:t>
+              <a:t> PS2).</a:t>
+            </a:r>
+          </a:p>
+          <a:p>
+            <a:r>
+              <a:rPr lang="en-US" dirty="0"/>
+              <a:t>This is hard to do when you need to support a wide range of hardware.</a:t>
             </a:r>
           </a:p>
         </p:txBody>
@@ -3720,7 +3784,7 @@
           <a:p>
             <a:r>
               <a:rPr lang="en-US" dirty="0"/>
-              <a:t>But, as we have hypervisors to abstract that hardware, don’t have problems they previously faced!</a:t>
+              <a:t>As have hypervisors to abstract hardware, we don’t have the problems mentioned in previous slide!</a:t>
             </a:r>
           </a:p>
           <a:p>
@@ -3732,7 +3796,7 @@
           <a:p>
             <a:r>
               <a:rPr lang="en-US" dirty="0"/>
-              <a:t>Paper tested this by developing an </a:t>
+              <a:t>The paper tested this idea by developing an </a:t>
             </a:r>
             <a:r>
               <a:rPr lang="en-US" dirty="0" err="1"/>
@@ -3832,13 +3896,21 @@
           <a:p>
             <a:r>
               <a:rPr lang="en-US" dirty="0"/>
-              <a:t>The world has now moved on from containers, so a single instance of the operating system can now be used to provide many services whilst still being relatively lightweight.</a:t>
-            </a:r>
-          </a:p>
-          <a:p>
-            <a:r>
-              <a:rPr lang="en-US" dirty="0"/>
-              <a:t>The reason companies put up with the cost of full-featured OSes is because they are relatively minor – if it was that important why wouldn’t companies who care about tiny gains in performance have tried moving towards an improved system already?</a:t>
+              <a:t>The world has now moved on to containers, so a single instance of the operating system can now be used to provide many services whilst still being relatively lightweight.</a:t>
+            </a:r>
+          </a:p>
+          <a:p>
+            <a:r>
+              <a:rPr lang="en-US" dirty="0"/>
+              <a:t>The reason companies put up with the costs of fully-featured OSes is because those </a:t>
+            </a:r>
+            <a:r>
+              <a:rPr lang="en-US" dirty="0" err="1"/>
+              <a:t>costst</a:t>
+            </a:r>
+            <a:r>
+              <a:rPr lang="en-US" dirty="0"/>
+              <a:t> are relatively minor – if it was that important why wouldn’t companies who care about tiny gains in performance have tried moving towards an improved system already?</a:t>
             </a:r>
           </a:p>
         </p:txBody>
@@ -3919,7 +3991,9 @@
         </p:nvSpPr>
         <p:spPr/>
         <p:txBody>
-          <a:bodyPr/>
+          <a:bodyPr>
+            <a:normAutofit lnSpcReduction="10000"/>
+          </a:bodyPr>
           <a:lstStyle/>
           <a:p>
             <a:r>
@@ -3928,7 +4002,15 @@
             </a:r>
             <a:r>
               <a:rPr lang="en-US" dirty="0"/>
-              <a:t> is not a widely used language.</a:t>
+              <a:t> is not a widely used language. (Also, Memory is cheap, a fleet of expert </a:t>
+            </a:r>
+            <a:r>
+              <a:rPr lang="en-US" dirty="0" err="1"/>
+              <a:t>OCaml</a:t>
+            </a:r>
+            <a:r>
+              <a:rPr lang="en-US" dirty="0"/>
+              <a:t> programmers possibly less so.)</a:t>
             </a:r>
           </a:p>
           <a:p>
@@ -3944,7 +4026,30 @@
             </a:r>
           </a:p>
           <a:p>
-            <a:endParaRPr lang="en-US" dirty="0"/>
+            <a:r>
+              <a:rPr lang="en-US" dirty="0"/>
+              <a:t>The Linux kernel has an estimated development cost of $1.4B, there is a reason people stick with the status quo.</a:t>
+            </a:r>
+          </a:p>
+          <a:p>
+            <a:r>
+              <a:rPr lang="en-US" dirty="0"/>
+              <a:t>The memory footprint reduction may not be that drastic if </a:t>
+            </a:r>
+            <a:r>
+              <a:rPr lang="en-US" dirty="0" err="1"/>
+              <a:t>MirageOS</a:t>
+            </a:r>
+            <a:r>
+              <a:rPr lang="en-US" dirty="0"/>
+              <a:t> ever became feature complete.</a:t>
+            </a:r>
+          </a:p>
+          <a:p>
+            <a:r>
+              <a:rPr lang="en-US" dirty="0"/>
+              <a:t>Type safety isn’t a guarantee of security, especially as existing software has endured years of attacks to improve it.</a:t>
+            </a:r>
           </a:p>
         </p:txBody>
       </p:sp>
@@ -4029,19 +4134,50 @@
           <a:p>
             <a:r>
               <a:rPr lang="en-US" dirty="0"/>
-              <a:t>Evaluation section</a:t>
-            </a:r>
-          </a:p>
-          <a:p>
-            <a:r>
-              <a:rPr lang="en-US" dirty="0"/>
-              <a:t>Random asides like </a:t>
+              <a:t>Concerns mainly lie in the evaluation section.</a:t>
+            </a:r>
+          </a:p>
+          <a:p>
+            <a:pPr lvl="1"/>
+            <a:r>
+              <a:rPr lang="en-US" dirty="0"/>
+              <a:t>The choices of microbenchmarks seem arbitrary.</a:t>
+            </a:r>
+          </a:p>
+          <a:p>
+            <a:pPr lvl="1"/>
+            <a:r>
+              <a:rPr lang="en-US" dirty="0"/>
+              <a:t>Line of Code (LoC) count just isn’t interesting or insightful.</a:t>
+            </a:r>
+          </a:p>
+          <a:p>
+            <a:r>
+              <a:rPr lang="en-US" dirty="0"/>
+              <a:t>Random asides like ‘this could run on </a:t>
             </a:r>
             <a:r>
               <a:rPr lang="en-US" dirty="0" err="1"/>
               <a:t>nodejs</a:t>
             </a:r>
-            <a:endParaRPr lang="en-US" dirty="0"/>
+            <a:r>
+              <a:rPr lang="en-US" dirty="0"/>
+              <a:t>’, without stating </a:t>
+            </a:r>
+            <a:r>
+              <a:rPr lang="en-US" i="1" dirty="0"/>
+              <a:t>why</a:t>
+            </a:r>
+            <a:r>
+              <a:rPr lang="en-US" dirty="0"/>
+              <a:t> that is interesting.</a:t>
+            </a:r>
+          </a:p>
+          <a:p>
+            <a:r>
+              <a:rPr lang="en-US" dirty="0"/>
+              <a:t>4-10% increase in latency described as ‘small’.</a:t>
+            </a:r>
           </a:p>
         </p:txBody>
       </p:sp>
@@ -4121,12 +4257,14 @@
         </p:nvSpPr>
         <p:spPr/>
         <p:txBody>
-          <a:bodyPr/>
-          <a:lstStyle/>
-          <a:p>
-            <a:r>
-              <a:rPr lang="en-US" dirty="0"/>
-              <a:t>Writing this presentation was tough, as on balance I actually quite like the idea and the paper</a:t>
+          <a:bodyPr>
+            <a:normAutofit/>
+          </a:bodyPr>
+          <a:lstStyle/>
+          <a:p>
+            <a:r>
+              <a:rPr lang="en-US" dirty="0"/>
+              <a:t>Writing this presentation was tough, as on balance I actually quite like the idea and the paper.</a:t>
             </a:r>
           </a:p>
           <a:p>
@@ -4142,7 +4280,7 @@
             </a:r>
             <a:r>
               <a:rPr lang="en-US" dirty="0"/>
-              <a:t> ), there still seems to be activity</a:t>
+              <a:t> ), there still seems to be activity.</a:t>
             </a:r>
           </a:p>
         </p:txBody>
@@ -4226,7 +4364,46 @@
           <a:bodyPr/>
           <a:lstStyle/>
           <a:p>
-            <a:endParaRPr lang="en-US"/>
+            <a:r>
+              <a:rPr lang="en-US" dirty="0"/>
+              <a:t>Questions for the developers:</a:t>
+            </a:r>
+          </a:p>
+          <a:p>
+            <a:pPr lvl="1"/>
+            <a:r>
+              <a:rPr lang="en-US" dirty="0"/>
+              <a:t>If taking a clean-slate approach to this project, or the idea of </a:t>
+            </a:r>
+            <a:r>
+              <a:rPr lang="en-US" dirty="0" err="1"/>
+              <a:t>unikernels</a:t>
+            </a:r>
+            <a:r>
+              <a:rPr lang="en-US" dirty="0"/>
+              <a:t>, what would you change based on what you learnt?</a:t>
+            </a:r>
+          </a:p>
+          <a:p>
+            <a:pPr lvl="1"/>
+            <a:r>
+              <a:rPr lang="en-US" dirty="0"/>
+              <a:t>What kind of software/projects can you think of where you would recommend people use </a:t>
+            </a:r>
+            <a:r>
+              <a:rPr lang="en-US" dirty="0" err="1"/>
+              <a:t>MirageOS</a:t>
+            </a:r>
+            <a:r>
+              <a:rPr lang="en-US" dirty="0"/>
+              <a:t> over other options considering its current state?</a:t>
+            </a:r>
+          </a:p>
+          <a:p>
+            <a:pPr marL="0" indent="0">
+              <a:buNone/>
+            </a:pPr>
+            <a:endParaRPr lang="en-US" dirty="0"/>
           </a:p>
         </p:txBody>
       </p:sp>

</xml_diff>